<commit_message>
PPT design review #1
</commit_message>
<xml_diff>
--- a/doc/DAQ_v3_DR1.pptx
+++ b/doc/DAQ_v3_DR1.pptx
@@ -5,10 +5,10 @@
     <p:sldMasterId id="2147483648" r:id="rId1"/>
   </p:sldMasterIdLst>
   <p:notesMasterIdLst>
-    <p:notesMasterId r:id="rId12"/>
+    <p:notesMasterId r:id="rId14"/>
   </p:notesMasterIdLst>
   <p:handoutMasterIdLst>
-    <p:handoutMasterId r:id="rId13"/>
+    <p:handoutMasterId r:id="rId15"/>
   </p:handoutMasterIdLst>
   <p:sldIdLst>
     <p:sldId id="256" r:id="rId2"/>
@@ -20,7 +20,9 @@
     <p:sldId id="270" r:id="rId8"/>
     <p:sldId id="271" r:id="rId9"/>
     <p:sldId id="272" r:id="rId10"/>
-    <p:sldId id="260" r:id="rId11"/>
+    <p:sldId id="273" r:id="rId11"/>
+    <p:sldId id="274" r:id="rId12"/>
+    <p:sldId id="260" r:id="rId13"/>
   </p:sldIdLst>
   <p:sldSz cx="9144000" cy="6858000" type="screen4x3"/>
   <p:notesSz cx="6858000" cy="9144000"/>
@@ -235,7 +237,7 @@
           <a:p>
             <a:fld id="{ACBCFFA3-0001-4B11-A9CE-4D3E04BF40C6}" type="datetimeFigureOut">
               <a:rPr lang="fr-CA" smtClean="0"/>
-              <a:t>2018-11-15</a:t>
+              <a:t>2019-01-09</a:t>
             </a:fld>
             <a:endParaRPr lang="fr-CA"/>
           </a:p>
@@ -401,7 +403,7 @@
           <a:p>
             <a:fld id="{88D10A91-1903-44FB-B749-46827FD3092D}" type="datetimeFigureOut">
               <a:rPr lang="fr-CA" smtClean="0"/>
-              <a:t>2018-11-15</a:t>
+              <a:t>2019-01-09</a:t>
             </a:fld>
             <a:endParaRPr lang="fr-CA"/>
           </a:p>
@@ -781,6 +783,136 @@
           <a:p>
             <a:r>
               <a:rPr lang="en-CA" dirty="0"/>
+              <a:t>Content Slide</a:t>
+            </a:r>
+            <a:endParaRPr lang="fr-CA" dirty="0"/>
+          </a:p>
+        </p:txBody>
+      </p:sp>
+    </p:spTree>
+    <p:extLst>
+      <p:ext uri="{BB962C8B-B14F-4D97-AF65-F5344CB8AC3E}">
+        <p14:creationId xmlns:p14="http://schemas.microsoft.com/office/powerpoint/2010/main" val="3885570748"/>
+      </p:ext>
+    </p:extLst>
+  </p:cSld>
+  <p:clrMapOvr>
+    <a:masterClrMapping/>
+  </p:clrMapOvr>
+</p:notes>
+</file>
+
+<file path=ppt/notesSlides/notesSlide11.xml><?xml version="1.0" encoding="utf-8"?>
+<p:notes xmlns:a="http://schemas.openxmlformats.org/drawingml/2006/main" xmlns:r="http://schemas.openxmlformats.org/officeDocument/2006/relationships" xmlns:p="http://schemas.openxmlformats.org/presentationml/2006/main">
+  <p:cSld>
+    <p:spTree>
+      <p:nvGrpSpPr>
+        <p:cNvPr id="1" name=""/>
+        <p:cNvGrpSpPr/>
+        <p:nvPr/>
+      </p:nvGrpSpPr>
+      <p:grpSpPr>
+        <a:xfrm>
+          <a:off x="0" y="0"/>
+          <a:ext cx="0" cy="0"/>
+          <a:chOff x="0" y="0"/>
+          <a:chExt cx="0" cy="0"/>
+        </a:xfrm>
+      </p:grpSpPr>
+      <p:sp>
+        <p:nvSpPr>
+          <p:cNvPr id="2" name="Slide Image Placeholder 1"/>
+          <p:cNvSpPr>
+            <a:spLocks noGrp="1" noRot="1" noChangeAspect="1"/>
+          </p:cNvSpPr>
+          <p:nvPr>
+            <p:ph type="sldImg"/>
+          </p:nvPr>
+        </p:nvSpPr>
+        <p:spPr/>
+      </p:sp>
+      <p:sp>
+        <p:nvSpPr>
+          <p:cNvPr id="3" name="Notes Placeholder 2"/>
+          <p:cNvSpPr>
+            <a:spLocks noGrp="1"/>
+          </p:cNvSpPr>
+          <p:nvPr>
+            <p:ph type="body" idx="1"/>
+          </p:nvPr>
+        </p:nvSpPr>
+        <p:spPr/>
+        <p:txBody>
+          <a:bodyPr/>
+          <a:lstStyle/>
+          <a:p>
+            <a:r>
+              <a:rPr lang="en-CA" dirty="0"/>
+              <a:t>Content Slide</a:t>
+            </a:r>
+            <a:endParaRPr lang="fr-CA" dirty="0"/>
+          </a:p>
+        </p:txBody>
+      </p:sp>
+    </p:spTree>
+    <p:extLst>
+      <p:ext uri="{BB962C8B-B14F-4D97-AF65-F5344CB8AC3E}">
+        <p14:creationId xmlns:p14="http://schemas.microsoft.com/office/powerpoint/2010/main" val="1464609474"/>
+      </p:ext>
+    </p:extLst>
+  </p:cSld>
+  <p:clrMapOvr>
+    <a:masterClrMapping/>
+  </p:clrMapOvr>
+</p:notes>
+</file>
+
+<file path=ppt/notesSlides/notesSlide12.xml><?xml version="1.0" encoding="utf-8"?>
+<p:notes xmlns:a="http://schemas.openxmlformats.org/drawingml/2006/main" xmlns:r="http://schemas.openxmlformats.org/officeDocument/2006/relationships" xmlns:p="http://schemas.openxmlformats.org/presentationml/2006/main">
+  <p:cSld>
+    <p:spTree>
+      <p:nvGrpSpPr>
+        <p:cNvPr id="1" name=""/>
+        <p:cNvGrpSpPr/>
+        <p:nvPr/>
+      </p:nvGrpSpPr>
+      <p:grpSpPr>
+        <a:xfrm>
+          <a:off x="0" y="0"/>
+          <a:ext cx="0" cy="0"/>
+          <a:chOff x="0" y="0"/>
+          <a:chExt cx="0" cy="0"/>
+        </a:xfrm>
+      </p:grpSpPr>
+      <p:sp>
+        <p:nvSpPr>
+          <p:cNvPr id="2" name="Slide Image Placeholder 1"/>
+          <p:cNvSpPr>
+            <a:spLocks noGrp="1" noRot="1" noChangeAspect="1"/>
+          </p:cNvSpPr>
+          <p:nvPr>
+            <p:ph type="sldImg"/>
+          </p:nvPr>
+        </p:nvSpPr>
+        <p:spPr/>
+      </p:sp>
+      <p:sp>
+        <p:nvSpPr>
+          <p:cNvPr id="3" name="Notes Placeholder 2"/>
+          <p:cNvSpPr>
+            <a:spLocks noGrp="1"/>
+          </p:cNvSpPr>
+          <p:nvPr>
+            <p:ph type="body" idx="1"/>
+          </p:nvPr>
+        </p:nvSpPr>
+        <p:spPr/>
+        <p:txBody>
+          <a:bodyPr/>
+          <a:lstStyle/>
+          <a:p>
+            <a:r>
+              <a:rPr lang="en-CA" dirty="0"/>
               <a:t>Final Slide</a:t>
             </a:r>
             <a:endParaRPr lang="fr-CA" dirty="0"/>
@@ -1501,7 +1633,7 @@
           <a:p>
             <a:fld id="{2AA6F41F-4984-4CC5-89AF-DF93759D9236}" type="datetime1">
               <a:rPr lang="fr-CA" smtClean="0"/>
-              <a:t>2018-11-15</a:t>
+              <a:t>2019-01-09</a:t>
             </a:fld>
             <a:endParaRPr lang="fr-CA"/>
           </a:p>
@@ -1674,7 +1806,7 @@
           <a:p>
             <a:fld id="{6D5F43C6-CA9A-4AB2-9359-AF2A07302FDF}" type="datetime1">
               <a:rPr lang="fr-CA" smtClean="0"/>
-              <a:t>2018-11-15</a:t>
+              <a:t>2019-01-09</a:t>
             </a:fld>
             <a:endParaRPr lang="fr-CA"/>
           </a:p>
@@ -1857,7 +1989,7 @@
           <a:p>
             <a:fld id="{6ADF4743-4D35-4CD1-A856-8576735073EF}" type="datetime1">
               <a:rPr lang="fr-CA" smtClean="0"/>
-              <a:t>2018-11-15</a:t>
+              <a:t>2019-01-09</a:t>
             </a:fld>
             <a:endParaRPr lang="fr-CA"/>
           </a:p>
@@ -2030,7 +2162,7 @@
           <a:p>
             <a:fld id="{D5B56666-723A-4B69-B6C1-172B8DDDEBCC}" type="datetime1">
               <a:rPr lang="fr-CA" smtClean="0"/>
-              <a:t>2018-11-15</a:t>
+              <a:t>2019-01-09</a:t>
             </a:fld>
             <a:endParaRPr lang="fr-CA"/>
           </a:p>
@@ -2353,7 +2485,7 @@
           <a:p>
             <a:fld id="{DE5CEA1D-AB57-4B13-A60A-BFF50B98751A}" type="datetime1">
               <a:rPr lang="fr-CA" smtClean="0"/>
-              <a:t>2018-11-15</a:t>
+              <a:t>2019-01-09</a:t>
             </a:fld>
             <a:endParaRPr lang="fr-CA"/>
           </a:p>
@@ -2644,7 +2776,7 @@
           <a:p>
             <a:fld id="{F70A0F43-B0EA-4E0B-A54E-0A0B873A67C9}" type="datetime1">
               <a:rPr lang="fr-CA" smtClean="0"/>
-              <a:t>2018-11-15</a:t>
+              <a:t>2019-01-09</a:t>
             </a:fld>
             <a:endParaRPr lang="fr-CA"/>
           </a:p>
@@ -3069,7 +3201,7 @@
           <a:p>
             <a:fld id="{260C196C-CFB1-48C9-A50F-584A0FA21464}" type="datetime1">
               <a:rPr lang="fr-CA" smtClean="0"/>
-              <a:t>2018-11-15</a:t>
+              <a:t>2019-01-09</a:t>
             </a:fld>
             <a:endParaRPr lang="fr-CA"/>
           </a:p>
@@ -3190,7 +3322,7 @@
           <a:p>
             <a:fld id="{718DA222-5F96-40B5-A96A-E9AFF1AED241}" type="datetime1">
               <a:rPr lang="fr-CA" smtClean="0"/>
-              <a:t>2018-11-15</a:t>
+              <a:t>2019-01-09</a:t>
             </a:fld>
             <a:endParaRPr lang="fr-CA"/>
           </a:p>
@@ -3288,7 +3420,7 @@
           <a:p>
             <a:fld id="{B61CCD4E-78E9-4A98-87D5-AB4FBE12CBE0}" type="datetime1">
               <a:rPr lang="fr-CA" smtClean="0"/>
-              <a:t>2018-11-15</a:t>
+              <a:t>2019-01-09</a:t>
             </a:fld>
             <a:endParaRPr lang="fr-CA"/>
           </a:p>
@@ -3568,7 +3700,7 @@
           <a:p>
             <a:fld id="{690A6A50-F256-4EF4-B925-DDA2F40AA5D3}" type="datetime1">
               <a:rPr lang="fr-CA" smtClean="0"/>
-              <a:t>2018-11-15</a:t>
+              <a:t>2019-01-09</a:t>
             </a:fld>
             <a:endParaRPr lang="fr-CA"/>
           </a:p>
@@ -3828,7 +3960,7 @@
           <a:p>
             <a:fld id="{A73C4DF0-1F1C-4831-8967-AABB5661D2F5}" type="datetime1">
               <a:rPr lang="fr-CA" smtClean="0"/>
-              <a:t>2018-11-15</a:t>
+              <a:t>2019-01-09</a:t>
             </a:fld>
             <a:endParaRPr lang="fr-CA"/>
           </a:p>
@@ -4044,7 +4176,7 @@
           <a:p>
             <a:fld id="{20BA8A37-B5AA-408C-AC2A-2FE79162EB10}" type="datetime1">
               <a:rPr lang="fr-CA" smtClean="0"/>
-              <a:t>2018-11-15</a:t>
+              <a:t>2019-01-09</a:t>
             </a:fld>
             <a:endParaRPr lang="fr-CA"/>
           </a:p>
@@ -4760,6 +4892,813 @@
 </file>
 
 <file path=ppt/slides/slide10.xml><?xml version="1.0" encoding="utf-8"?>
+<p:sld xmlns:a="http://schemas.openxmlformats.org/drawingml/2006/main" xmlns:r="http://schemas.openxmlformats.org/officeDocument/2006/relationships" xmlns:p="http://schemas.openxmlformats.org/presentationml/2006/main">
+  <p:cSld>
+    <p:spTree>
+      <p:nvGrpSpPr>
+        <p:cNvPr id="1" name=""/>
+        <p:cNvGrpSpPr/>
+        <p:nvPr/>
+      </p:nvGrpSpPr>
+      <p:grpSpPr>
+        <a:xfrm>
+          <a:off x="0" y="0"/>
+          <a:ext cx="0" cy="0"/>
+          <a:chOff x="0" y="0"/>
+          <a:chExt cx="0" cy="0"/>
+        </a:xfrm>
+      </p:grpSpPr>
+      <p:sp>
+        <p:nvSpPr>
+          <p:cNvPr id="7" name="AutoShape 12"/>
+          <p:cNvSpPr>
+            <a:spLocks noChangeArrowheads="1"/>
+          </p:cNvSpPr>
+          <p:nvPr/>
+        </p:nvSpPr>
+        <p:spPr bwMode="auto">
+          <a:xfrm rot="5400000">
+            <a:off x="6916208" y="68772"/>
+            <a:ext cx="581614" cy="1079797"/>
+          </a:xfrm>
+          <a:prstGeom prst="flowChartManualInput">
+            <a:avLst/>
+          </a:prstGeom>
+          <a:solidFill>
+            <a:srgbClr val="12A3DD"/>
+          </a:solidFill>
+          <a:ln>
+            <a:noFill/>
+          </a:ln>
+          <a:extLst>
+            <a:ext uri="{91240B29-F687-4F45-9708-019B960494DF}">
+              <a14:hiddenLine xmlns:a14="http://schemas.microsoft.com/office/drawing/2010/main" w="9525">
+                <a:solidFill>
+                  <a:srgbClr val="000000"/>
+                </a:solidFill>
+                <a:miter lim="800000"/>
+                <a:headEnd/>
+                <a:tailEnd/>
+              </a14:hiddenLine>
+            </a:ext>
+          </a:extLst>
+        </p:spPr>
+        <p:txBody>
+          <a:bodyPr rot="0" vert="horz" wrap="square" lIns="91440" tIns="45720" rIns="91440" bIns="45720" anchor="t" anchorCtr="0" upright="1">
+            <a:noAutofit/>
+          </a:bodyPr>
+          <a:lstStyle/>
+          <a:p>
+            <a:endParaRPr lang="fr-CA"/>
+          </a:p>
+        </p:txBody>
+      </p:sp>
+      <p:sp>
+        <p:nvSpPr>
+          <p:cNvPr id="8" name="Rectangle 7"/>
+          <p:cNvSpPr>
+            <a:spLocks noChangeArrowheads="1"/>
+          </p:cNvSpPr>
+          <p:nvPr/>
+        </p:nvSpPr>
+        <p:spPr bwMode="auto">
+          <a:xfrm>
+            <a:off x="617550" y="317862"/>
+            <a:ext cx="6330714" cy="581614"/>
+          </a:xfrm>
+          <a:prstGeom prst="rect">
+            <a:avLst/>
+          </a:prstGeom>
+          <a:solidFill>
+            <a:srgbClr val="12A3DD"/>
+          </a:solidFill>
+          <a:ln>
+            <a:noFill/>
+          </a:ln>
+          <a:extLst>
+            <a:ext uri="{91240B29-F687-4F45-9708-019B960494DF}">
+              <a14:hiddenLine xmlns:a14="http://schemas.microsoft.com/office/drawing/2010/main" w="9525">
+                <a:solidFill>
+                  <a:srgbClr val="000000"/>
+                </a:solidFill>
+                <a:miter lim="800000"/>
+                <a:headEnd/>
+                <a:tailEnd/>
+              </a14:hiddenLine>
+            </a:ext>
+          </a:extLst>
+        </p:spPr>
+        <p:txBody>
+          <a:bodyPr rot="0" vert="horz" wrap="square" lIns="91440" tIns="45720" rIns="91440" bIns="45720" anchor="t" anchorCtr="0" upright="1">
+            <a:noAutofit/>
+          </a:bodyPr>
+          <a:lstStyle/>
+          <a:p>
+            <a:endParaRPr lang="fr-CA"/>
+          </a:p>
+        </p:txBody>
+      </p:sp>
+      <p:sp>
+        <p:nvSpPr>
+          <p:cNvPr id="9" name="Oval 8"/>
+          <p:cNvSpPr/>
+          <p:nvPr/>
+        </p:nvSpPr>
+        <p:spPr>
+          <a:xfrm>
+            <a:off x="201930" y="234742"/>
+            <a:ext cx="735995" cy="735965"/>
+          </a:xfrm>
+          <a:prstGeom prst="ellipse">
+            <a:avLst/>
+          </a:prstGeom>
+          <a:solidFill>
+            <a:schemeClr val="bg1"/>
+          </a:solidFill>
+          <a:ln>
+            <a:noFill/>
+          </a:ln>
+        </p:spPr>
+        <p:style>
+          <a:lnRef idx="2">
+            <a:schemeClr val="accent1">
+              <a:shade val="50000"/>
+            </a:schemeClr>
+          </a:lnRef>
+          <a:fillRef idx="1">
+            <a:schemeClr val="accent1"/>
+          </a:fillRef>
+          <a:effectRef idx="0">
+            <a:schemeClr val="accent1"/>
+          </a:effectRef>
+          <a:fontRef idx="minor">
+            <a:schemeClr val="lt1"/>
+          </a:fontRef>
+        </p:style>
+        <p:txBody>
+          <a:bodyPr rot="0" spcFirstLastPara="0" vert="horz" wrap="square" lIns="91440" tIns="45720" rIns="91440" bIns="45720" numCol="1" spcCol="0" rtlCol="0" fromWordArt="0" anchor="ctr" anchorCtr="0" forceAA="0" compatLnSpc="1">
+            <a:prstTxWarp prst="textNoShape">
+              <a:avLst/>
+            </a:prstTxWarp>
+            <a:noAutofit/>
+          </a:bodyPr>
+          <a:lstStyle/>
+          <a:p>
+            <a:endParaRPr lang="fr-CA"/>
+          </a:p>
+        </p:txBody>
+      </p:sp>
+      <p:pic>
+        <p:nvPicPr>
+          <p:cNvPr id="5" name="Picture 4">
+            <a:hlinkClick r:id="rId3"/>
+          </p:cNvPr>
+          <p:cNvPicPr/>
+          <p:nvPr/>
+        </p:nvPicPr>
+        <p:blipFill rotWithShape="1">
+          <a:blip r:embed="rId4" cstate="print">
+            <a:extLst>
+              <a:ext uri="{28A0092B-C50C-407E-A947-70E740481C1C}">
+                <a14:useLocalDpi xmlns:a14="http://schemas.microsoft.com/office/drawing/2010/main" val="0"/>
+              </a:ext>
+            </a:extLst>
+          </a:blip>
+          <a:srcRect r="61984"/>
+          <a:stretch/>
+        </p:blipFill>
+        <p:spPr bwMode="auto">
+          <a:xfrm>
+            <a:off x="0" y="116632"/>
+            <a:ext cx="1092200" cy="1033145"/>
+          </a:xfrm>
+          <a:prstGeom prst="rect">
+            <a:avLst/>
+          </a:prstGeom>
+          <a:ln>
+            <a:noFill/>
+          </a:ln>
+          <a:extLst>
+            <a:ext uri="{53640926-AAD7-44D8-BBD7-CCE9431645EC}">
+              <a14:shadowObscured xmlns:a14="http://schemas.microsoft.com/office/drawing/2010/main"/>
+            </a:ext>
+          </a:extLst>
+        </p:spPr>
+      </p:pic>
+      <p:sp>
+        <p:nvSpPr>
+          <p:cNvPr id="6" name="Text Box 2"/>
+          <p:cNvSpPr txBox="1">
+            <a:spLocks noChangeArrowheads="1"/>
+          </p:cNvSpPr>
+          <p:nvPr/>
+        </p:nvSpPr>
+        <p:spPr bwMode="auto">
+          <a:xfrm>
+            <a:off x="1698625" y="283627"/>
+            <a:ext cx="5746750" cy="553085"/>
+          </a:xfrm>
+          <a:prstGeom prst="rect">
+            <a:avLst/>
+          </a:prstGeom>
+          <a:noFill/>
+          <a:ln>
+            <a:noFill/>
+          </a:ln>
+          <a:extLst>
+            <a:ext uri="{909E8E84-426E-40DD-AFC4-6F175D3DCCD1}">
+              <a14:hiddenFill xmlns:a14="http://schemas.microsoft.com/office/drawing/2010/main">
+                <a:solidFill>
+                  <a:srgbClr val="FFFFFF"/>
+                </a:solidFill>
+              </a14:hiddenFill>
+            </a:ext>
+            <a:ext uri="{91240B29-F687-4F45-9708-019B960494DF}">
+              <a14:hiddenLine xmlns:a14="http://schemas.microsoft.com/office/drawing/2010/main" w="9525">
+                <a:solidFill>
+                  <a:srgbClr val="000000"/>
+                </a:solidFill>
+                <a:miter lim="800000"/>
+                <a:headEnd/>
+                <a:tailEnd/>
+              </a14:hiddenLine>
+            </a:ext>
+          </a:extLst>
+        </p:spPr>
+        <p:txBody>
+          <a:bodyPr rot="0" vert="horz" wrap="square" lIns="91440" tIns="45720" rIns="91440" bIns="45720" anchor="t" anchorCtr="0" upright="1">
+            <a:noAutofit/>
+          </a:bodyPr>
+          <a:lstStyle/>
+          <a:p>
+            <a:pPr algn="ctr">
+              <a:lnSpc>
+                <a:spcPct val="115000"/>
+              </a:lnSpc>
+              <a:spcBef>
+                <a:spcPts val="300"/>
+              </a:spcBef>
+              <a:spcAft>
+                <a:spcPts val="1000"/>
+              </a:spcAft>
+            </a:pPr>
+            <a:r>
+              <a:rPr lang="fr-CA" sz="3200" b="1" kern="7200" cap="small" spc="-100" dirty="0" err="1">
+                <a:solidFill>
+                  <a:srgbClr val="FFFFFF"/>
+                </a:solidFill>
+                <a:effectLst/>
+                <a:latin typeface="Arial"/>
+                <a:ea typeface="Times New Roman"/>
+              </a:rPr>
+              <a:t>Layout</a:t>
+            </a:r>
+            <a:endParaRPr lang="fr-CA" sz="3200" b="1" kern="7200" cap="small" spc="-100" dirty="0">
+              <a:solidFill>
+                <a:srgbClr val="FFFFFF"/>
+              </a:solidFill>
+              <a:effectLst/>
+              <a:latin typeface="Arial"/>
+              <a:ea typeface="Times New Roman"/>
+            </a:endParaRPr>
+          </a:p>
+          <a:p>
+            <a:pPr algn="ctr">
+              <a:lnSpc>
+                <a:spcPct val="115000"/>
+              </a:lnSpc>
+              <a:spcBef>
+                <a:spcPts val="300"/>
+              </a:spcBef>
+              <a:spcAft>
+                <a:spcPts val="1000"/>
+              </a:spcAft>
+            </a:pPr>
+            <a:r>
+              <a:rPr lang="fr-CA" sz="2600" b="1" cap="small" dirty="0">
+                <a:effectLst/>
+                <a:latin typeface="Arial"/>
+                <a:ea typeface="Times New Roman"/>
+                <a:cs typeface="Arial"/>
+              </a:rPr>
+              <a:t> </a:t>
+            </a:r>
+            <a:endParaRPr lang="fr-CA" sz="1100" dirty="0">
+              <a:effectLst/>
+              <a:latin typeface="Arial"/>
+              <a:ea typeface="Times New Roman"/>
+              <a:cs typeface="Times New Roman"/>
+            </a:endParaRPr>
+          </a:p>
+          <a:p>
+            <a:pPr>
+              <a:lnSpc>
+                <a:spcPct val="115000"/>
+              </a:lnSpc>
+              <a:spcBef>
+                <a:spcPts val="300"/>
+              </a:spcBef>
+              <a:spcAft>
+                <a:spcPts val="1000"/>
+              </a:spcAft>
+            </a:pPr>
+            <a:r>
+              <a:rPr lang="fr-CA" sz="1100" dirty="0">
+                <a:effectLst/>
+                <a:latin typeface="Arial"/>
+                <a:ea typeface="Times New Roman"/>
+                <a:cs typeface="Times New Roman"/>
+              </a:rPr>
+              <a:t> </a:t>
+            </a:r>
+          </a:p>
+        </p:txBody>
+      </p:sp>
+      <p:pic>
+        <p:nvPicPr>
+          <p:cNvPr id="11" name="Picture 10"/>
+          <p:cNvPicPr/>
+          <p:nvPr/>
+        </p:nvPicPr>
+        <p:blipFill>
+          <a:blip r:embed="rId5">
+            <a:extLst>
+              <a:ext uri="{28A0092B-C50C-407E-A947-70E740481C1C}">
+                <a14:useLocalDpi xmlns:a14="http://schemas.microsoft.com/office/drawing/2010/main" val="0"/>
+              </a:ext>
+            </a:extLst>
+          </a:blip>
+          <a:srcRect/>
+          <a:stretch>
+            <a:fillRect/>
+          </a:stretch>
+        </p:blipFill>
+        <p:spPr bwMode="auto">
+          <a:xfrm>
+            <a:off x="6058217" y="4619069"/>
+            <a:ext cx="3122295" cy="2266315"/>
+          </a:xfrm>
+          <a:prstGeom prst="rect">
+            <a:avLst/>
+          </a:prstGeom>
+          <a:noFill/>
+          <a:ln>
+            <a:noFill/>
+          </a:ln>
+        </p:spPr>
+      </p:pic>
+      <p:pic>
+        <p:nvPicPr>
+          <p:cNvPr id="15" name="Content Placeholder 14">
+            <a:extLst>
+              <a:ext uri="{FF2B5EF4-FFF2-40B4-BE49-F238E27FC236}">
+                <a16:creationId xmlns:a16="http://schemas.microsoft.com/office/drawing/2014/main" id="{21B380E4-E3A1-47A6-906B-6DFF171717B1}"/>
+              </a:ext>
+            </a:extLst>
+          </p:cNvPr>
+          <p:cNvPicPr>
+            <a:picLocks noGrp="1" noChangeAspect="1"/>
+          </p:cNvPicPr>
+          <p:nvPr>
+            <p:ph idx="1"/>
+          </p:nvPr>
+        </p:nvPicPr>
+        <p:blipFill rotWithShape="1">
+          <a:blip r:embed="rId6">
+            <a:extLst>
+              <a:ext uri="{28A0092B-C50C-407E-A947-70E740481C1C}">
+                <a14:useLocalDpi xmlns:a14="http://schemas.microsoft.com/office/drawing/2010/main" val="0"/>
+              </a:ext>
+            </a:extLst>
+          </a:blip>
+          <a:srcRect l="23456" t="21315" r="23974" b="13454"/>
+          <a:stretch/>
+        </p:blipFill>
+        <p:spPr>
+          <a:xfrm>
+            <a:off x="747784" y="1232897"/>
+            <a:ext cx="7648432" cy="5335784"/>
+          </a:xfrm>
+        </p:spPr>
+      </p:pic>
+    </p:spTree>
+    <p:extLst>
+      <p:ext uri="{BB962C8B-B14F-4D97-AF65-F5344CB8AC3E}">
+        <p14:creationId xmlns:p14="http://schemas.microsoft.com/office/powerpoint/2010/main" val="1422277949"/>
+      </p:ext>
+    </p:extLst>
+  </p:cSld>
+  <p:clrMapOvr>
+    <a:masterClrMapping/>
+  </p:clrMapOvr>
+</p:sld>
+</file>
+
+<file path=ppt/slides/slide11.xml><?xml version="1.0" encoding="utf-8"?>
+<p:sld xmlns:a="http://schemas.openxmlformats.org/drawingml/2006/main" xmlns:r="http://schemas.openxmlformats.org/officeDocument/2006/relationships" xmlns:p="http://schemas.openxmlformats.org/presentationml/2006/main">
+  <p:cSld>
+    <p:spTree>
+      <p:nvGrpSpPr>
+        <p:cNvPr id="1" name=""/>
+        <p:cNvGrpSpPr/>
+        <p:nvPr/>
+      </p:nvGrpSpPr>
+      <p:grpSpPr>
+        <a:xfrm>
+          <a:off x="0" y="0"/>
+          <a:ext cx="0" cy="0"/>
+          <a:chOff x="0" y="0"/>
+          <a:chExt cx="0" cy="0"/>
+        </a:xfrm>
+      </p:grpSpPr>
+      <p:sp>
+        <p:nvSpPr>
+          <p:cNvPr id="7" name="AutoShape 12"/>
+          <p:cNvSpPr>
+            <a:spLocks noChangeArrowheads="1"/>
+          </p:cNvSpPr>
+          <p:nvPr/>
+        </p:nvSpPr>
+        <p:spPr bwMode="auto">
+          <a:xfrm rot="5400000">
+            <a:off x="6916208" y="68772"/>
+            <a:ext cx="581614" cy="1079797"/>
+          </a:xfrm>
+          <a:prstGeom prst="flowChartManualInput">
+            <a:avLst/>
+          </a:prstGeom>
+          <a:solidFill>
+            <a:srgbClr val="12A3DD"/>
+          </a:solidFill>
+          <a:ln>
+            <a:noFill/>
+          </a:ln>
+          <a:extLst>
+            <a:ext uri="{91240B29-F687-4F45-9708-019B960494DF}">
+              <a14:hiddenLine xmlns:a14="http://schemas.microsoft.com/office/drawing/2010/main" w="9525">
+                <a:solidFill>
+                  <a:srgbClr val="000000"/>
+                </a:solidFill>
+                <a:miter lim="800000"/>
+                <a:headEnd/>
+                <a:tailEnd/>
+              </a14:hiddenLine>
+            </a:ext>
+          </a:extLst>
+        </p:spPr>
+        <p:txBody>
+          <a:bodyPr rot="0" vert="horz" wrap="square" lIns="91440" tIns="45720" rIns="91440" bIns="45720" anchor="t" anchorCtr="0" upright="1">
+            <a:noAutofit/>
+          </a:bodyPr>
+          <a:lstStyle/>
+          <a:p>
+            <a:endParaRPr lang="fr-CA"/>
+          </a:p>
+        </p:txBody>
+      </p:sp>
+      <p:sp>
+        <p:nvSpPr>
+          <p:cNvPr id="8" name="Rectangle 7"/>
+          <p:cNvSpPr>
+            <a:spLocks noChangeArrowheads="1"/>
+          </p:cNvSpPr>
+          <p:nvPr/>
+        </p:nvSpPr>
+        <p:spPr bwMode="auto">
+          <a:xfrm>
+            <a:off x="617550" y="317862"/>
+            <a:ext cx="6330714" cy="581614"/>
+          </a:xfrm>
+          <a:prstGeom prst="rect">
+            <a:avLst/>
+          </a:prstGeom>
+          <a:solidFill>
+            <a:srgbClr val="12A3DD"/>
+          </a:solidFill>
+          <a:ln>
+            <a:noFill/>
+          </a:ln>
+          <a:extLst>
+            <a:ext uri="{91240B29-F687-4F45-9708-019B960494DF}">
+              <a14:hiddenLine xmlns:a14="http://schemas.microsoft.com/office/drawing/2010/main" w="9525">
+                <a:solidFill>
+                  <a:srgbClr val="000000"/>
+                </a:solidFill>
+                <a:miter lim="800000"/>
+                <a:headEnd/>
+                <a:tailEnd/>
+              </a14:hiddenLine>
+            </a:ext>
+          </a:extLst>
+        </p:spPr>
+        <p:txBody>
+          <a:bodyPr rot="0" vert="horz" wrap="square" lIns="91440" tIns="45720" rIns="91440" bIns="45720" anchor="t" anchorCtr="0" upright="1">
+            <a:noAutofit/>
+          </a:bodyPr>
+          <a:lstStyle/>
+          <a:p>
+            <a:endParaRPr lang="fr-CA"/>
+          </a:p>
+        </p:txBody>
+      </p:sp>
+      <p:sp>
+        <p:nvSpPr>
+          <p:cNvPr id="9" name="Oval 8"/>
+          <p:cNvSpPr/>
+          <p:nvPr/>
+        </p:nvSpPr>
+        <p:spPr>
+          <a:xfrm>
+            <a:off x="201930" y="234742"/>
+            <a:ext cx="735995" cy="735965"/>
+          </a:xfrm>
+          <a:prstGeom prst="ellipse">
+            <a:avLst/>
+          </a:prstGeom>
+          <a:solidFill>
+            <a:schemeClr val="bg1"/>
+          </a:solidFill>
+          <a:ln>
+            <a:noFill/>
+          </a:ln>
+        </p:spPr>
+        <p:style>
+          <a:lnRef idx="2">
+            <a:schemeClr val="accent1">
+              <a:shade val="50000"/>
+            </a:schemeClr>
+          </a:lnRef>
+          <a:fillRef idx="1">
+            <a:schemeClr val="accent1"/>
+          </a:fillRef>
+          <a:effectRef idx="0">
+            <a:schemeClr val="accent1"/>
+          </a:effectRef>
+          <a:fontRef idx="minor">
+            <a:schemeClr val="lt1"/>
+          </a:fontRef>
+        </p:style>
+        <p:txBody>
+          <a:bodyPr rot="0" spcFirstLastPara="0" vert="horz" wrap="square" lIns="91440" tIns="45720" rIns="91440" bIns="45720" numCol="1" spcCol="0" rtlCol="0" fromWordArt="0" anchor="ctr" anchorCtr="0" forceAA="0" compatLnSpc="1">
+            <a:prstTxWarp prst="textNoShape">
+              <a:avLst/>
+            </a:prstTxWarp>
+            <a:noAutofit/>
+          </a:bodyPr>
+          <a:lstStyle/>
+          <a:p>
+            <a:endParaRPr lang="fr-CA"/>
+          </a:p>
+        </p:txBody>
+      </p:sp>
+      <p:pic>
+        <p:nvPicPr>
+          <p:cNvPr id="5" name="Picture 4">
+            <a:hlinkClick r:id="rId3"/>
+          </p:cNvPr>
+          <p:cNvPicPr/>
+          <p:nvPr/>
+        </p:nvPicPr>
+        <p:blipFill rotWithShape="1">
+          <a:blip r:embed="rId4" cstate="print">
+            <a:extLst>
+              <a:ext uri="{28A0092B-C50C-407E-A947-70E740481C1C}">
+                <a14:useLocalDpi xmlns:a14="http://schemas.microsoft.com/office/drawing/2010/main" val="0"/>
+              </a:ext>
+            </a:extLst>
+          </a:blip>
+          <a:srcRect r="61984"/>
+          <a:stretch/>
+        </p:blipFill>
+        <p:spPr bwMode="auto">
+          <a:xfrm>
+            <a:off x="0" y="116632"/>
+            <a:ext cx="1092200" cy="1033145"/>
+          </a:xfrm>
+          <a:prstGeom prst="rect">
+            <a:avLst/>
+          </a:prstGeom>
+          <a:ln>
+            <a:noFill/>
+          </a:ln>
+          <a:extLst>
+            <a:ext uri="{53640926-AAD7-44D8-BBD7-CCE9431645EC}">
+              <a14:shadowObscured xmlns:a14="http://schemas.microsoft.com/office/drawing/2010/main"/>
+            </a:ext>
+          </a:extLst>
+        </p:spPr>
+      </p:pic>
+      <p:sp>
+        <p:nvSpPr>
+          <p:cNvPr id="6" name="Text Box 2"/>
+          <p:cNvSpPr txBox="1">
+            <a:spLocks noChangeArrowheads="1"/>
+          </p:cNvSpPr>
+          <p:nvPr/>
+        </p:nvSpPr>
+        <p:spPr bwMode="auto">
+          <a:xfrm>
+            <a:off x="1698625" y="283627"/>
+            <a:ext cx="5746750" cy="553085"/>
+          </a:xfrm>
+          <a:prstGeom prst="rect">
+            <a:avLst/>
+          </a:prstGeom>
+          <a:noFill/>
+          <a:ln>
+            <a:noFill/>
+          </a:ln>
+          <a:extLst>
+            <a:ext uri="{909E8E84-426E-40DD-AFC4-6F175D3DCCD1}">
+              <a14:hiddenFill xmlns:a14="http://schemas.microsoft.com/office/drawing/2010/main">
+                <a:solidFill>
+                  <a:srgbClr val="FFFFFF"/>
+                </a:solidFill>
+              </a14:hiddenFill>
+            </a:ext>
+            <a:ext uri="{91240B29-F687-4F45-9708-019B960494DF}">
+              <a14:hiddenLine xmlns:a14="http://schemas.microsoft.com/office/drawing/2010/main" w="9525">
+                <a:solidFill>
+                  <a:srgbClr val="000000"/>
+                </a:solidFill>
+                <a:miter lim="800000"/>
+                <a:headEnd/>
+                <a:tailEnd/>
+              </a14:hiddenLine>
+            </a:ext>
+          </a:extLst>
+        </p:spPr>
+        <p:txBody>
+          <a:bodyPr rot="0" vert="horz" wrap="square" lIns="91440" tIns="45720" rIns="91440" bIns="45720" anchor="t" anchorCtr="0" upright="1">
+            <a:noAutofit/>
+          </a:bodyPr>
+          <a:lstStyle/>
+          <a:p>
+            <a:pPr algn="ctr">
+              <a:lnSpc>
+                <a:spcPct val="115000"/>
+              </a:lnSpc>
+              <a:spcBef>
+                <a:spcPts val="300"/>
+              </a:spcBef>
+              <a:spcAft>
+                <a:spcPts val="1000"/>
+              </a:spcAft>
+            </a:pPr>
+            <a:r>
+              <a:rPr lang="fr-CA" sz="3200" b="1" kern="7200" cap="small" spc="-100" dirty="0" err="1">
+                <a:solidFill>
+                  <a:srgbClr val="FFFFFF"/>
+                </a:solidFill>
+                <a:effectLst/>
+                <a:latin typeface="Arial"/>
+                <a:ea typeface="Times New Roman"/>
+              </a:rPr>
+              <a:t>Layout</a:t>
+            </a:r>
+            <a:endParaRPr lang="fr-CA" sz="3200" b="1" kern="7200" cap="small" spc="-100" dirty="0">
+              <a:solidFill>
+                <a:srgbClr val="FFFFFF"/>
+              </a:solidFill>
+              <a:effectLst/>
+              <a:latin typeface="Arial"/>
+              <a:ea typeface="Times New Roman"/>
+            </a:endParaRPr>
+          </a:p>
+          <a:p>
+            <a:pPr algn="ctr">
+              <a:lnSpc>
+                <a:spcPct val="115000"/>
+              </a:lnSpc>
+              <a:spcBef>
+                <a:spcPts val="300"/>
+              </a:spcBef>
+              <a:spcAft>
+                <a:spcPts val="1000"/>
+              </a:spcAft>
+            </a:pPr>
+            <a:r>
+              <a:rPr lang="fr-CA" sz="2600" b="1" cap="small" dirty="0">
+                <a:effectLst/>
+                <a:latin typeface="Arial"/>
+                <a:ea typeface="Times New Roman"/>
+                <a:cs typeface="Arial"/>
+              </a:rPr>
+              <a:t> </a:t>
+            </a:r>
+            <a:endParaRPr lang="fr-CA" sz="1100" dirty="0">
+              <a:effectLst/>
+              <a:latin typeface="Arial"/>
+              <a:ea typeface="Times New Roman"/>
+              <a:cs typeface="Times New Roman"/>
+            </a:endParaRPr>
+          </a:p>
+          <a:p>
+            <a:pPr>
+              <a:lnSpc>
+                <a:spcPct val="115000"/>
+              </a:lnSpc>
+              <a:spcBef>
+                <a:spcPts val="300"/>
+              </a:spcBef>
+              <a:spcAft>
+                <a:spcPts val="1000"/>
+              </a:spcAft>
+            </a:pPr>
+            <a:r>
+              <a:rPr lang="fr-CA" sz="1100" dirty="0">
+                <a:effectLst/>
+                <a:latin typeface="Arial"/>
+                <a:ea typeface="Times New Roman"/>
+                <a:cs typeface="Times New Roman"/>
+              </a:rPr>
+              <a:t> </a:t>
+            </a:r>
+          </a:p>
+        </p:txBody>
+      </p:sp>
+      <p:pic>
+        <p:nvPicPr>
+          <p:cNvPr id="11" name="Picture 10"/>
+          <p:cNvPicPr/>
+          <p:nvPr/>
+        </p:nvPicPr>
+        <p:blipFill>
+          <a:blip r:embed="rId5">
+            <a:extLst>
+              <a:ext uri="{28A0092B-C50C-407E-A947-70E740481C1C}">
+                <a14:useLocalDpi xmlns:a14="http://schemas.microsoft.com/office/drawing/2010/main" val="0"/>
+              </a:ext>
+            </a:extLst>
+          </a:blip>
+          <a:srcRect/>
+          <a:stretch>
+            <a:fillRect/>
+          </a:stretch>
+        </p:blipFill>
+        <p:spPr bwMode="auto">
+          <a:xfrm>
+            <a:off x="6058217" y="4619069"/>
+            <a:ext cx="3122295" cy="2266315"/>
+          </a:xfrm>
+          <a:prstGeom prst="rect">
+            <a:avLst/>
+          </a:prstGeom>
+          <a:noFill/>
+          <a:ln>
+            <a:noFill/>
+          </a:ln>
+        </p:spPr>
+      </p:pic>
+      <p:pic>
+        <p:nvPicPr>
+          <p:cNvPr id="17" name="Picture 16">
+            <a:extLst>
+              <a:ext uri="{FF2B5EF4-FFF2-40B4-BE49-F238E27FC236}">
+                <a16:creationId xmlns:a16="http://schemas.microsoft.com/office/drawing/2014/main" id="{CB6BE974-7C4B-4F2D-8861-B48BC97EA44B}"/>
+              </a:ext>
+            </a:extLst>
+          </p:cNvPr>
+          <p:cNvPicPr>
+            <a:picLocks noChangeAspect="1"/>
+          </p:cNvPicPr>
+          <p:nvPr/>
+        </p:nvPicPr>
+        <p:blipFill rotWithShape="1">
+          <a:blip r:embed="rId6">
+            <a:extLst>
+              <a:ext uri="{28A0092B-C50C-407E-A947-70E740481C1C}">
+                <a14:useLocalDpi xmlns:a14="http://schemas.microsoft.com/office/drawing/2010/main" val="0"/>
+              </a:ext>
+            </a:extLst>
+          </a:blip>
+          <a:srcRect l="26631" t="28990" r="27087" b="19185"/>
+          <a:stretch/>
+        </p:blipFill>
+        <p:spPr>
+          <a:xfrm>
+            <a:off x="702978" y="1635640"/>
+            <a:ext cx="7738044" cy="4871637"/>
+          </a:xfrm>
+          <a:prstGeom prst="rect">
+            <a:avLst/>
+          </a:prstGeom>
+        </p:spPr>
+      </p:pic>
+    </p:spTree>
+    <p:extLst>
+      <p:ext uri="{BB962C8B-B14F-4D97-AF65-F5344CB8AC3E}">
+        <p14:creationId xmlns:p14="http://schemas.microsoft.com/office/powerpoint/2010/main" val="174058301"/>
+      </p:ext>
+    </p:extLst>
+  </p:cSld>
+  <p:clrMapOvr>
+    <a:masterClrMapping/>
+  </p:clrMapOvr>
+</p:sld>
+</file>
+
+<file path=ppt/slides/slide12.xml><?xml version="1.0" encoding="utf-8"?>
 <p:sld xmlns:a="http://schemas.openxmlformats.org/drawingml/2006/main" xmlns:r="http://schemas.openxmlformats.org/officeDocument/2006/relationships" xmlns:p="http://schemas.openxmlformats.org/presentationml/2006/main">
   <p:cSld>
     <p:spTree>
@@ -6990,7 +7929,7 @@
             </a:r>
             <a:r>
               <a:rPr lang="en-US" sz="2800" dirty="0"/>
-              <a:t> de 5mA…</a:t>
+              <a:t> de 5mA</a:t>
             </a:r>
           </a:p>
           <a:p>
@@ -7416,51 +8355,13 @@
             </a:r>
             <a:r>
               <a:rPr lang="en-US" dirty="0"/>
-              <a:t> que le Dash v3, qui </a:t>
+              <a:t> que </a:t>
             </a:r>
             <a:r>
               <a:rPr lang="en-US" dirty="0" err="1"/>
-              <a:t>fonctionnait</a:t>
-            </a:r>
-            <a:r>
-              <a:rPr lang="en-US" dirty="0"/>
-              <a:t> </a:t>
-            </a:r>
-            <a:r>
-              <a:rPr lang="en-US" dirty="0" err="1"/>
-              <a:t>très</a:t>
-            </a:r>
-            <a:r>
-              <a:rPr lang="en-US" dirty="0"/>
-              <a:t> bien</a:t>
-            </a:r>
-          </a:p>
-          <a:p>
-            <a:r>
-              <a:rPr lang="en-US" dirty="0" err="1"/>
-              <a:t>Besoin</a:t>
-            </a:r>
-            <a:r>
-              <a:rPr lang="en-US" dirty="0"/>
-              <a:t> des </a:t>
-            </a:r>
-            <a:r>
-              <a:rPr lang="en-US" dirty="0" err="1"/>
-              <a:t>résistances</a:t>
-            </a:r>
-            <a:r>
-              <a:rPr lang="en-US" dirty="0"/>
-              <a:t> de </a:t>
-            </a:r>
-            <a:r>
-              <a:rPr lang="en-US" dirty="0" err="1"/>
-              <a:t>terminaison</a:t>
-            </a:r>
-            <a:r>
-              <a:rPr lang="en-US" dirty="0"/>
-              <a:t>?</a:t>
-            </a:r>
-            <a:endParaRPr lang="fr-CA" dirty="0"/>
+              <a:t>tous</a:t>
+            </a:r>
+            <a:endParaRPr lang="en-US" dirty="0"/>
           </a:p>
           <a:p>
             <a:pPr lvl="4"/>
@@ -7503,8 +8404,8 @@
         </p:blipFill>
         <p:spPr>
           <a:xfrm>
-            <a:off x="1690308" y="2988188"/>
-            <a:ext cx="5473979" cy="3313137"/>
+            <a:off x="1216047" y="2247885"/>
+            <a:ext cx="6711905" cy="4062394"/>
           </a:xfrm>
           <a:prstGeom prst="rect">
             <a:avLst/>
@@ -8852,7 +9753,7 @@
         </p:spPr>
         <p:txBody>
           <a:bodyPr>
-            <a:normAutofit fontScale="92500" lnSpcReduction="10000"/>
+            <a:normAutofit/>
           </a:bodyPr>
           <a:lstStyle/>
           <a:p>
@@ -8946,111 +9847,33 @@
             </a:r>
           </a:p>
           <a:p>
-            <a:pPr lvl="1"/>
-            <a:r>
-              <a:rPr lang="en-US" dirty="0">
-                <a:sym typeface="Wingdings" panose="05000000000000000000" pitchFamily="2" charset="2"/>
-              </a:rPr>
-              <a:t>On </a:t>
-            </a:r>
-            <a:r>
-              <a:rPr lang="en-US" dirty="0" err="1">
-                <a:sym typeface="Wingdings" panose="05000000000000000000" pitchFamily="2" charset="2"/>
-              </a:rPr>
-              <a:t>est</a:t>
-            </a:r>
-            <a:r>
-              <a:rPr lang="en-US" dirty="0">
-                <a:sym typeface="Wingdings" panose="05000000000000000000" pitchFamily="2" charset="2"/>
-              </a:rPr>
-              <a:t> capable de </a:t>
-            </a:r>
-            <a:r>
-              <a:rPr lang="en-US" dirty="0" err="1">
-                <a:sym typeface="Wingdings" panose="05000000000000000000" pitchFamily="2" charset="2"/>
-              </a:rPr>
-              <a:t>souder</a:t>
-            </a:r>
-            <a:r>
-              <a:rPr lang="en-US" dirty="0">
-                <a:sym typeface="Wingdings" panose="05000000000000000000" pitchFamily="2" charset="2"/>
-              </a:rPr>
-              <a:t> sans </a:t>
-            </a:r>
-            <a:r>
-              <a:rPr lang="en-US" dirty="0" err="1">
-                <a:sym typeface="Wingdings" panose="05000000000000000000" pitchFamily="2" charset="2"/>
-              </a:rPr>
-              <a:t>créer</a:t>
-            </a:r>
-            <a:r>
-              <a:rPr lang="en-US" dirty="0">
-                <a:sym typeface="Wingdings" panose="05000000000000000000" pitchFamily="2" charset="2"/>
-              </a:rPr>
+            <a:r>
+              <a:rPr lang="en-US" dirty="0" err="1"/>
+              <a:t>Ajout</a:t>
+            </a:r>
+            <a:r>
+              <a:rPr lang="en-US" dirty="0"/>
+              <a:t> batterie dans pin du GPS pour </a:t>
+            </a:r>
+            <a:r>
+              <a:rPr lang="en-US" dirty="0" err="1"/>
+              <a:t>qu’il</a:t>
+            </a:r>
+            <a:r>
+              <a:rPr lang="en-US" dirty="0"/>
+              <a:t> ne cold-restart pas à </a:t>
+            </a:r>
+            <a:r>
+              <a:rPr lang="en-US" dirty="0" err="1"/>
+              <a:t>chaque</a:t>
+            </a:r>
+            <a:r>
+              <a:rPr lang="en-US" dirty="0"/>
               <a:t> </a:t>
             </a:r>
             <a:r>
-              <a:rPr lang="en-US" dirty="0" err="1">
-                <a:sym typeface="Wingdings" panose="05000000000000000000" pitchFamily="2" charset="2"/>
-              </a:rPr>
-              <a:t>mille</a:t>
-            </a:r>
-            <a:r>
-              <a:rPr lang="en-US" dirty="0">
-                <a:sym typeface="Wingdings" panose="05000000000000000000" pitchFamily="2" charset="2"/>
-              </a:rPr>
-              <a:t> </a:t>
-            </a:r>
-            <a:r>
-              <a:rPr lang="en-US" dirty="0" err="1">
-                <a:sym typeface="Wingdings" panose="05000000000000000000" pitchFamily="2" charset="2"/>
-              </a:rPr>
-              <a:t>impédance</a:t>
-            </a:r>
-            <a:r>
-              <a:rPr lang="en-US" dirty="0">
-                <a:sym typeface="Wingdings" panose="05000000000000000000" pitchFamily="2" charset="2"/>
-              </a:rPr>
-              <a:t> </a:t>
-            </a:r>
-            <a:r>
-              <a:rPr lang="en-US" dirty="0" err="1">
-                <a:sym typeface="Wingdings" panose="05000000000000000000" pitchFamily="2" charset="2"/>
-              </a:rPr>
-              <a:t>d’extra</a:t>
-            </a:r>
-            <a:endParaRPr lang="en-US" dirty="0">
-              <a:sym typeface="Wingdings" panose="05000000000000000000" pitchFamily="2" charset="2"/>
-            </a:endParaRPr>
-          </a:p>
-          <a:p>
-            <a:pPr lvl="1"/>
-            <a:r>
               <a:rPr lang="en-US" dirty="0" err="1"/>
-              <a:t>Bref</a:t>
-            </a:r>
-            <a:r>
-              <a:rPr lang="en-US" dirty="0"/>
-              <a:t>, je </a:t>
-            </a:r>
-            <a:r>
-              <a:rPr lang="en-US" dirty="0" err="1"/>
-              <a:t>vais</a:t>
-            </a:r>
-            <a:r>
-              <a:rPr lang="en-US" dirty="0"/>
-              <a:t> tester le dash v2 </a:t>
-            </a:r>
-            <a:r>
-              <a:rPr lang="en-US" dirty="0" err="1"/>
-              <a:t>avant</a:t>
-            </a:r>
-            <a:endParaRPr lang="en-US" dirty="0"/>
-          </a:p>
-          <a:p>
-            <a:r>
-              <a:rPr lang="en-US" dirty="0"/>
-              <a:t>RTC avec batterie sur le board</a:t>
+              <a:t>fois</a:t>
             </a:r>
             <a:endParaRPr lang="fr-CA" dirty="0"/>
           </a:p>

</xml_diff>